<commit_message>
I changed my file from html to php
</commit_message>
<xml_diff>
--- a/Frame, EER diagram & SQL files/Nicole_Final_Project_Framing_Template.pptx
+++ b/Frame, EER diagram & SQL files/Nicole_Final_Project_Framing_Template.pptx
@@ -11,6 +11,7 @@
     <p:sldId id="259" r:id="rId5"/>
     <p:sldId id="261" r:id="rId6"/>
     <p:sldId id="260" r:id="rId7"/>
+    <p:sldId id="262" r:id="rId8"/>
   </p:sldIdLst>
   <p:sldSz cx="12192000" cy="6858000"/>
   <p:notesSz cx="6858000" cy="9144000"/>
@@ -310,7 +311,7 @@
           <a:p>
             <a:fld id="{5A11CC1C-E4D1-4E15-90A8-C95BF9B87F70}" type="datetimeFigureOut">
               <a:rPr lang="en-US" smtClean="0"/>
-              <a:t>12/7/2021</a:t>
+              <a:t>12/10/2021</a:t>
             </a:fld>
             <a:endParaRPr lang="en-US" dirty="0"/>
           </a:p>
@@ -545,7 +546,7 @@
           <a:p>
             <a:fld id="{5A11CC1C-E4D1-4E15-90A8-C95BF9B87F70}" type="datetimeFigureOut">
               <a:rPr lang="en-US" smtClean="0"/>
-              <a:t>12/7/2021</a:t>
+              <a:t>12/10/2021</a:t>
             </a:fld>
             <a:endParaRPr lang="en-US" dirty="0"/>
           </a:p>
@@ -753,7 +754,7 @@
           <a:p>
             <a:fld id="{5A11CC1C-E4D1-4E15-90A8-C95BF9B87F70}" type="datetimeFigureOut">
               <a:rPr lang="en-US" smtClean="0"/>
-              <a:t>12/7/2021</a:t>
+              <a:t>12/10/2021</a:t>
             </a:fld>
             <a:endParaRPr lang="en-US" dirty="0"/>
           </a:p>
@@ -959,7 +960,7 @@
           <a:p>
             <a:fld id="{5A11CC1C-E4D1-4E15-90A8-C95BF9B87F70}" type="datetimeFigureOut">
               <a:rPr lang="en-US" smtClean="0"/>
-              <a:t>12/7/2021</a:t>
+              <a:t>12/10/2021</a:t>
             </a:fld>
             <a:endParaRPr lang="en-US" dirty="0"/>
           </a:p>
@@ -1270,7 +1271,7 @@
           <a:p>
             <a:fld id="{5A11CC1C-E4D1-4E15-90A8-C95BF9B87F70}" type="datetimeFigureOut">
               <a:rPr lang="en-US" smtClean="0"/>
-              <a:t>12/7/2021</a:t>
+              <a:t>12/10/2021</a:t>
             </a:fld>
             <a:endParaRPr lang="en-US" dirty="0"/>
           </a:p>
@@ -1535,7 +1536,7 @@
           <a:p>
             <a:fld id="{5A11CC1C-E4D1-4E15-90A8-C95BF9B87F70}" type="datetimeFigureOut">
               <a:rPr lang="en-US" smtClean="0"/>
-              <a:t>12/7/2021</a:t>
+              <a:t>12/10/2021</a:t>
             </a:fld>
             <a:endParaRPr lang="en-US" dirty="0"/>
           </a:p>
@@ -1947,7 +1948,7 @@
           <a:p>
             <a:fld id="{5A11CC1C-E4D1-4E15-90A8-C95BF9B87F70}" type="datetimeFigureOut">
               <a:rPr lang="en-US" smtClean="0"/>
-              <a:t>12/7/2021</a:t>
+              <a:t>12/10/2021</a:t>
             </a:fld>
             <a:endParaRPr lang="en-US" dirty="0"/>
           </a:p>
@@ -2093,7 +2094,7 @@
           <a:p>
             <a:fld id="{5A11CC1C-E4D1-4E15-90A8-C95BF9B87F70}" type="datetimeFigureOut">
               <a:rPr lang="en-US" smtClean="0"/>
-              <a:t>12/7/2021</a:t>
+              <a:t>12/10/2021</a:t>
             </a:fld>
             <a:endParaRPr lang="en-US" dirty="0"/>
           </a:p>
@@ -2206,7 +2207,7 @@
           <a:p>
             <a:fld id="{5A11CC1C-E4D1-4E15-90A8-C95BF9B87F70}" type="datetimeFigureOut">
               <a:rPr lang="en-US" smtClean="0"/>
-              <a:t>12/7/2021</a:t>
+              <a:t>12/10/2021</a:t>
             </a:fld>
             <a:endParaRPr lang="en-US" dirty="0"/>
           </a:p>
@@ -2517,7 +2518,7 @@
           <a:p>
             <a:fld id="{5A11CC1C-E4D1-4E15-90A8-C95BF9B87F70}" type="datetimeFigureOut">
               <a:rPr lang="en-US" smtClean="0"/>
-              <a:t>12/7/2021</a:t>
+              <a:t>12/10/2021</a:t>
             </a:fld>
             <a:endParaRPr lang="en-US" dirty="0"/>
           </a:p>
@@ -2808,7 +2809,7 @@
           <a:p>
             <a:fld id="{5A11CC1C-E4D1-4E15-90A8-C95BF9B87F70}" type="datetimeFigureOut">
               <a:rPr lang="en-US" smtClean="0"/>
-              <a:t>12/7/2021</a:t>
+              <a:t>12/10/2021</a:t>
             </a:fld>
             <a:endParaRPr lang="en-US" dirty="0"/>
           </a:p>
@@ -3049,7 +3050,7 @@
           <a:p>
             <a:fld id="{5A11CC1C-E4D1-4E15-90A8-C95BF9B87F70}" type="datetimeFigureOut">
               <a:rPr lang="en-US" smtClean="0"/>
-              <a:t>12/7/2021</a:t>
+              <a:t>12/10/2021</a:t>
             </a:fld>
             <a:endParaRPr lang="en-US" dirty="0"/>
           </a:p>
@@ -3677,13 +3678,7 @@
               <a:rPr lang="en-US" sz="4200" b="1" i="1" dirty="0" smtClean="0">
                 <a:effectLst/>
               </a:rPr>
-              <a:t>the problem of overcrowding in their restaurant and also giving customers the convenience of making </a:t>
-            </a:r>
-            <a:r>
-              <a:rPr lang="en-US" sz="4200" b="1" i="1" dirty="0" smtClean="0">
-                <a:effectLst/>
-              </a:rPr>
-              <a:t>their orders ahead of time.</a:t>
+              <a:t>the problem of overcrowding in their restaurant and also giving customers the convenience of making their orders ahead of time.</a:t>
             </a:r>
             <a:r>
               <a:rPr lang="en-US" sz="4200" i="1" dirty="0">
@@ -5292,15 +5287,7 @@
             </a:pPr>
             <a:r>
               <a:rPr lang="en-US" sz="2400" dirty="0" smtClean="0"/>
-              <a:t>Displays the foods available </a:t>
-            </a:r>
-            <a:r>
-              <a:rPr lang="en-US" sz="2400" dirty="0" smtClean="0"/>
-              <a:t>during </a:t>
-            </a:r>
-            <a:r>
-              <a:rPr lang="en-US" sz="2400" dirty="0" smtClean="0"/>
-              <a:t>the day.</a:t>
+              <a:t>Displays the foods available during the day.</a:t>
             </a:r>
           </a:p>
           <a:p>
@@ -5310,13 +5297,8 @@
             </a:pPr>
             <a:r>
               <a:rPr lang="en-US" sz="2400" dirty="0" smtClean="0"/>
-              <a:t>Stores customers entry in the system’s database</a:t>
-            </a:r>
-            <a:r>
-              <a:rPr lang="en-US" sz="2400" dirty="0" smtClean="0"/>
-              <a:t>.</a:t>
-            </a:r>
-            <a:endParaRPr lang="en-US" sz="2400" dirty="0" smtClean="0"/>
+              <a:t>Stores customers entry in the system’s database.</a:t>
+            </a:r>
           </a:p>
         </p:txBody>
       </p:sp>
@@ -6095,6 +6077,137 @@
 </p:sld>
 </file>
 
+<file path=ppt/slides/slide7.xml><?xml version="1.0" encoding="utf-8"?>
+<p:sld xmlns:a="http://schemas.openxmlformats.org/drawingml/2006/main" xmlns:r="http://schemas.openxmlformats.org/officeDocument/2006/relationships" xmlns:p="http://schemas.openxmlformats.org/presentationml/2006/main">
+  <p:cSld>
+    <p:spTree>
+      <p:nvGrpSpPr>
+        <p:cNvPr id="1" name=""/>
+        <p:cNvGrpSpPr/>
+        <p:nvPr/>
+      </p:nvGrpSpPr>
+      <p:grpSpPr>
+        <a:xfrm>
+          <a:off x="0" y="0"/>
+          <a:ext cx="0" cy="0"/>
+          <a:chOff x="0" y="0"/>
+          <a:chExt cx="0" cy="0"/>
+        </a:xfrm>
+      </p:grpSpPr>
+      <p:sp>
+        <p:nvSpPr>
+          <p:cNvPr id="2" name="Title 1"/>
+          <p:cNvSpPr>
+            <a:spLocks noGrp="1"/>
+          </p:cNvSpPr>
+          <p:nvPr>
+            <p:ph type="title"/>
+          </p:nvPr>
+        </p:nvSpPr>
+        <p:spPr/>
+        <p:txBody>
+          <a:bodyPr/>
+          <a:lstStyle/>
+          <a:p>
+            <a:r>
+              <a:rPr lang="en-US" dirty="0" smtClean="0"/>
+              <a:t>LINK </a:t>
+            </a:r>
+            <a:r>
+              <a:rPr lang="en-US" dirty="0" smtClean="0"/>
+              <a:t>TO</a:t>
+            </a:r>
+            <a:endParaRPr lang="en-US" dirty="0"/>
+          </a:p>
+        </p:txBody>
+      </p:sp>
+      <p:sp>
+        <p:nvSpPr>
+          <p:cNvPr id="3" name="Content Placeholder 2"/>
+          <p:cNvSpPr>
+            <a:spLocks noGrp="1"/>
+          </p:cNvSpPr>
+          <p:nvPr>
+            <p:ph idx="1"/>
+          </p:nvPr>
+        </p:nvSpPr>
+        <p:spPr/>
+        <p:txBody>
+          <a:bodyPr/>
+          <a:lstStyle/>
+          <a:p>
+            <a:r>
+              <a:rPr lang="en-US" dirty="0"/>
+              <a:t>GIT </a:t>
+            </a:r>
+            <a:r>
+              <a:rPr lang="en-US" dirty="0" smtClean="0"/>
+              <a:t>HUB== </a:t>
+            </a:r>
+            <a:r>
+              <a:rPr lang="en-US" dirty="0" smtClean="0">
+                <a:hlinkClick r:id="rId2"/>
+              </a:rPr>
+              <a:t>https</a:t>
+            </a:r>
+            <a:r>
+              <a:rPr lang="en-US" dirty="0">
+                <a:hlinkClick r:id="rId2"/>
+              </a:rPr>
+              <a:t>://</a:t>
+            </a:r>
+            <a:r>
+              <a:rPr lang="en-US" dirty="0" smtClean="0">
+                <a:hlinkClick r:id="rId2"/>
+              </a:rPr>
+              <a:t>github.com/Nicole05-git/Final-Project</a:t>
+            </a:r>
+            <a:endParaRPr lang="en-US" dirty="0"/>
+          </a:p>
+          <a:p>
+            <a:endParaRPr lang="en-US" dirty="0" smtClean="0"/>
+          </a:p>
+          <a:p>
+            <a:r>
+              <a:rPr lang="en-US" dirty="0" err="1" smtClean="0"/>
+              <a:t>Sharepoint</a:t>
+            </a:r>
+            <a:r>
+              <a:rPr lang="en-US" dirty="0"/>
+              <a:t>== </a:t>
+            </a:r>
+            <a:r>
+              <a:rPr lang="en-US" dirty="0">
+                <a:hlinkClick r:id="rId3"/>
+              </a:rPr>
+              <a:t>https://aucampus-my.sharepoint.com/:f:/</a:t>
+            </a:r>
+            <a:r>
+              <a:rPr lang="en-US" dirty="0" smtClean="0">
+                <a:hlinkClick r:id="rId3"/>
+              </a:rPr>
+              <a:t>g/personal/nicole_koranteng_ashesi_edu_gh/Evn5DC9are5Fgntw9NQDwG4BSLIHB5zfPTBUqxbP1VIOpw?e=w8sGD6</a:t>
+            </a:r>
+            <a:endParaRPr lang="en-US" dirty="0" smtClean="0"/>
+          </a:p>
+          <a:p>
+            <a:endParaRPr lang="en-US" dirty="0"/>
+          </a:p>
+        </p:txBody>
+      </p:sp>
+    </p:spTree>
+    <p:extLst>
+      <p:ext uri="{BB962C8B-B14F-4D97-AF65-F5344CB8AC3E}">
+        <p14:creationId xmlns:p14="http://schemas.microsoft.com/office/powerpoint/2010/main" val="1876277788"/>
+      </p:ext>
+    </p:extLst>
+  </p:cSld>
+  <p:clrMapOvr>
+    <a:masterClrMapping/>
+  </p:clrMapOvr>
+</p:sld>
+</file>
+
 <file path=ppt/theme/theme1.xml><?xml version="1.0" encoding="utf-8"?>
 <a:theme xmlns:a="http://schemas.openxmlformats.org/drawingml/2006/main" name="Office Theme">
   <a:themeElements>

</xml_diff>